<commit_message>
modifica post esame metodo getter
</commit_message>
<xml_diff>
--- a/Projects/Presentazione_Progetto_PCS.pptx
+++ b/Projects/Presentazione_Progetto_PCS.pptx
@@ -275,7 +275,7 @@
   </p:defaultTextStyle>
   <p:extLst>
     <p:ext uri="GoogleSlidesCustomDataVersion2">
-      <go:slidesCustomData xmlns:go="http://customooxmlschemas.google.com/" r:id="rId30" roundtripDataSignature="AMtx7mhrGezGnzp0c4XwmwXsD2FgJsU05w=="/>
+      <go:slidesCustomData xmlns:go="http://customooxmlschemas.google.com/" r:id="rId30" roundtripDataSignature="AMtx7mhbnlahzKb34cKbKtXEnx+kE20VkQ=="/>
     </p:ext>
   </p:extLst>
 </p:presentation>
@@ -20726,7 +20726,7 @@
         <p:spPr>
           <a:xfrm>
             <a:off x="-309973" y="1818862"/>
-            <a:ext cx="10704275" cy="4998547"/>
+            <a:ext cx="10704300" cy="4998600"/>
           </a:xfrm>
           <a:prstGeom prst="rect">
             <a:avLst/>
@@ -20894,36 +20894,9 @@
           </a:ln>
         </p:spPr>
       </p:cxnSp>
-      <p:pic>
-        <p:nvPicPr>
-          <p:cNvPr id="298" name="Google Shape;298;p15"/>
-          <p:cNvPicPr preferRelativeResize="0"/>
-          <p:nvPr/>
-        </p:nvPicPr>
-        <p:blipFill rotWithShape="1">
-          <a:blip r:embed="rId3">
-            <a:alphaModFix/>
-          </a:blip>
-          <a:srcRect b="0" l="0" r="0" t="0"/>
-          <a:stretch/>
-        </p:blipFill>
-        <p:spPr>
-          <a:xfrm>
-            <a:off x="351377" y="1932875"/>
-            <a:ext cx="5349704" cy="4503810"/>
-          </a:xfrm>
-          <a:prstGeom prst="rect">
-            <a:avLst/>
-          </a:prstGeom>
-          <a:noFill/>
-          <a:ln>
-            <a:noFill/>
-          </a:ln>
-        </p:spPr>
-      </p:pic>
       <p:sp>
         <p:nvSpPr>
-          <p:cNvPr id="299" name="Google Shape;299;p15"/>
+          <p:cNvPr id="298" name="Google Shape;298;p15"/>
           <p:cNvSpPr txBox="1"/>
           <p:nvPr/>
         </p:nvSpPr>
@@ -20987,6 +20960,34 @@
           </a:p>
         </p:txBody>
       </p:sp>
+      <p:pic>
+        <p:nvPicPr>
+          <p:cNvPr id="299" name="Google Shape;299;p15"/>
+          <p:cNvPicPr preferRelativeResize="0"/>
+          <p:nvPr/>
+        </p:nvPicPr>
+        <p:blipFill>
+          <a:blip r:embed="rId3">
+            <a:alphaModFix/>
+          </a:blip>
+          <a:stretch>
+            <a:fillRect/>
+          </a:stretch>
+        </p:blipFill>
+        <p:spPr>
+          <a:xfrm>
+            <a:off x="473575" y="1983625"/>
+            <a:ext cx="5307250" cy="4669000"/>
+          </a:xfrm>
+          <a:prstGeom prst="rect">
+            <a:avLst/>
+          </a:prstGeom>
+          <a:noFill/>
+          <a:ln>
+            <a:noFill/>
+          </a:ln>
+        </p:spPr>
+      </p:pic>
     </p:spTree>
   </p:cSld>
   <p:clrMapOvr>
@@ -23343,8 +23344,8 @@
         </p:blipFill>
         <p:spPr>
           <a:xfrm>
-            <a:off x="2566975" y="285500"/>
-            <a:ext cx="6971174" cy="6366336"/>
+            <a:off x="2637520" y="285500"/>
+            <a:ext cx="6916957" cy="6316825"/>
           </a:xfrm>
           <a:prstGeom prst="rect">
             <a:avLst/>

</xml_diff>